<commit_message>
missing docs/ updated & uploaded, trendet_twipper case study finished
</commit_message>
<xml_diff>
--- a/docs/tcue_presentación.pptx
+++ b/docs/tcue_presentación.pptx
@@ -3489,13 +3489,6 @@
               </a:rPr>
               <a:t>4. Trabajo Futuro</a:t>
             </a:r>
-            <a:endParaRPr lang="es-ES" sz="2800" dirty="0">
-              <a:solidFill>
-                <a:schemeClr val="accent4">
-                  <a:lumMod val="75000"/>
-                </a:schemeClr>
-              </a:solidFill>
-            </a:endParaRPr>
           </a:p>
         </p:txBody>
       </p:sp>
@@ -3866,13 +3859,6 @@
               </a:rPr>
               <a:t>4. Trabajo Futuro</a:t>
             </a:r>
-            <a:endParaRPr lang="es-ES" sz="2800" dirty="0">
-              <a:solidFill>
-                <a:schemeClr val="accent4">
-                  <a:lumMod val="75000"/>
-                </a:schemeClr>
-              </a:solidFill>
-            </a:endParaRPr>
           </a:p>
         </p:txBody>
       </p:sp>
@@ -3919,7 +3905,7 @@
         <p:spPr>
           <a:xfrm>
             <a:off x="3869268" y="864108"/>
-            <a:ext cx="7315200" cy="1253450"/>
+            <a:ext cx="7635376" cy="1253450"/>
           </a:xfrm>
         </p:spPr>
         <p:txBody>
@@ -3955,8 +3941,8 @@
         </p:nvSpPr>
         <p:spPr>
           <a:xfrm>
-            <a:off x="3869268" y="4958257"/>
-            <a:ext cx="7315200" cy="1253450"/>
+            <a:off x="3869267" y="4731298"/>
+            <a:ext cx="7635377" cy="1398093"/>
           </a:xfrm>
           <a:prstGeom prst="rect">
             <a:avLst/>
@@ -3964,7 +3950,7 @@
         </p:spPr>
         <p:txBody>
           <a:bodyPr vert="horz" lIns="91440" tIns="45720" rIns="91440" bIns="45720" rtlCol="0" anchor="ctr">
-            <a:normAutofit fontScale="92500"/>
+            <a:normAutofit fontScale="85000" lnSpcReduction="10000"/>
           </a:bodyPr>
           <a:lstStyle>
             <a:lvl1pPr marL="182880" indent="-182880" algn="l" defTabSz="914400" rtl="0" eaLnBrk="1" latinLnBrk="0" hangingPunct="1">
@@ -4212,7 +4198,19 @@
             <a:pPr algn="just"/>
             <a:r>
               <a:rPr lang="es-ES" dirty="0" smtClean="0"/>
-              <a:t>El impacto de la opinión por medio del análisis de sentimiento de Twitter junto con la identificación de las tendencias pasadas a modo de caso de estudio, refleja que es bastante parejo el comportamiento del mercado para con el análisis de opinión de Twitter.</a:t>
+              <a:t>El impacto de la opinión por medio del análisis de sentimiento de Twitter junto con la identificación de las tendencias pasadas a modo de caso de </a:t>
+            </a:r>
+            <a:r>
+              <a:rPr lang="es-ES" dirty="0" smtClean="0"/>
+              <a:t>estudio no es concluyente. Esto se debe a las grandes carencias que hay de soluciones para el NLP en español, y más en concreto, en lo que a análisis de sentimientos se refiere por la ausencia de </a:t>
+            </a:r>
+            <a:r>
+              <a:rPr lang="es-ES" dirty="0" err="1" smtClean="0"/>
+              <a:t>datasets</a:t>
+            </a:r>
+            <a:r>
+              <a:rPr lang="es-ES" dirty="0" smtClean="0"/>
+              <a:t> clasificados en español. Esto implica que aún se encuentra bajo proceso de investigación y desarrollo.</a:t>
             </a:r>
             <a:endParaRPr lang="es-ES" dirty="0"/>
           </a:p>
@@ -4234,7 +4232,7 @@
         </p:blipFill>
         <p:spPr>
           <a:xfrm>
-            <a:off x="4573539" y="2328767"/>
+            <a:off x="4573539" y="2215288"/>
             <a:ext cx="5896043" cy="2418280"/>
           </a:xfrm>
           <a:prstGeom prst="rect">
@@ -4450,27 +4448,7 @@
                   </a:schemeClr>
                 </a:solidFill>
               </a:rPr>
-              <a:t>4. </a:t>
-            </a:r>
-            <a:r>
-              <a:rPr lang="es-ES" sz="2800" dirty="0" smtClean="0">
-                <a:solidFill>
-                  <a:schemeClr val="accent4">
-                    <a:lumMod val="75000"/>
-                  </a:schemeClr>
-                </a:solidFill>
-              </a:rPr>
-              <a:t>Trabajo </a:t>
-            </a:r>
-            <a:r>
-              <a:rPr lang="es-ES" sz="2800" dirty="0" smtClean="0">
-                <a:solidFill>
-                  <a:schemeClr val="accent4">
-                    <a:lumMod val="75000"/>
-                  </a:schemeClr>
-                </a:solidFill>
-              </a:rPr>
-              <a:t>Futuro</a:t>
+              <a:t>4. Trabajo Futuro</a:t>
             </a:r>
             <a:endParaRPr lang="es-ES" sz="2800" dirty="0">
               <a:solidFill>
@@ -5125,13 +5103,6 @@
               </a:rPr>
               <a:t>4. Trabajo Futuro</a:t>
             </a:r>
-            <a:endParaRPr lang="es-ES" sz="2800" dirty="0">
-              <a:solidFill>
-                <a:schemeClr val="accent4">
-                  <a:lumMod val="75000"/>
-                </a:schemeClr>
-              </a:solidFill>
-            </a:endParaRPr>
           </a:p>
         </p:txBody>
       </p:sp>
@@ -5475,13 +5446,6 @@
               </a:rPr>
               <a:t>4. Trabajo Futuro</a:t>
             </a:r>
-            <a:endParaRPr lang="es-ES" sz="2800" dirty="0">
-              <a:solidFill>
-                <a:schemeClr val="accent4">
-                  <a:lumMod val="75000"/>
-                </a:schemeClr>
-              </a:solidFill>
-            </a:endParaRPr>
           </a:p>
         </p:txBody>
       </p:sp>
@@ -5824,13 +5788,6 @@
               </a:rPr>
               <a:t>4. Trabajo Futuro</a:t>
             </a:r>
-            <a:endParaRPr lang="es-ES" sz="2800" dirty="0">
-              <a:solidFill>
-                <a:schemeClr val="accent4">
-                  <a:lumMod val="75000"/>
-                </a:schemeClr>
-              </a:solidFill>
-            </a:endParaRPr>
           </a:p>
         </p:txBody>
       </p:sp>
@@ -6168,13 +6125,6 @@
               </a:rPr>
               <a:t>4. Trabajo Futuro</a:t>
             </a:r>
-            <a:endParaRPr lang="es-ES" sz="2800" dirty="0">
-              <a:solidFill>
-                <a:schemeClr val="accent4">
-                  <a:lumMod val="75000"/>
-                </a:schemeClr>
-              </a:solidFill>
-            </a:endParaRPr>
           </a:p>
         </p:txBody>
       </p:sp>
@@ -6512,13 +6462,6 @@
               </a:rPr>
               <a:t>4. Trabajo Futuro</a:t>
             </a:r>
-            <a:endParaRPr lang="es-ES" sz="2800" dirty="0">
-              <a:solidFill>
-                <a:schemeClr val="accent4">
-                  <a:lumMod val="75000"/>
-                </a:schemeClr>
-              </a:solidFill>
-            </a:endParaRPr>
           </a:p>
         </p:txBody>
       </p:sp>
@@ -6848,13 +6791,6 @@
               </a:rPr>
               <a:t>4. Trabajo Futuro</a:t>
             </a:r>
-            <a:endParaRPr lang="es-ES" sz="2800" dirty="0">
-              <a:solidFill>
-                <a:schemeClr val="accent4">
-                  <a:lumMod val="75000"/>
-                </a:schemeClr>
-              </a:solidFill>
-            </a:endParaRPr>
           </a:p>
         </p:txBody>
       </p:sp>
@@ -7241,13 +7177,6 @@
               </a:rPr>
               <a:t>4. Trabajo Futuro</a:t>
             </a:r>
-            <a:endParaRPr lang="es-ES" sz="2800" dirty="0">
-              <a:solidFill>
-                <a:schemeClr val="accent4">
-                  <a:lumMod val="75000"/>
-                </a:schemeClr>
-              </a:solidFill>
-            </a:endParaRPr>
           </a:p>
         </p:txBody>
       </p:sp>
@@ -7859,13 +7788,6 @@
               </a:rPr>
               <a:t>4. Trabajo Futuro</a:t>
             </a:r>
-            <a:endParaRPr lang="es-ES" sz="2800" dirty="0">
-              <a:solidFill>
-                <a:schemeClr val="accent4">
-                  <a:lumMod val="75000"/>
-                </a:schemeClr>
-              </a:solidFill>
-            </a:endParaRPr>
           </a:p>
         </p:txBody>
       </p:sp>

</xml_diff>